<commit_message>
MJB updated CA1 slides
</commit_message>
<xml_diff>
--- a/Part_1_Resources_for_computational_modellers/2_Structured_data_from_literature/3_CA1.pptx
+++ b/Part_1_Resources_for_computational_modellers/2_Structured_data_from_literature/3_CA1.pptx
@@ -284,7 +284,7 @@
             <a:fld id="{8627792D-E4D0-F04E-BA11-9EFDB5AABB2E}" type="datetimeFigureOut">
               <a:rPr lang="en-US" altLang="x-none"/>
               <a:pPr/>
-              <a:t>7/14/17</a:t>
+              <a:t>7/15/17</a:t>
             </a:fld>
             <a:endParaRPr lang="en-US" altLang="x-none"/>
           </a:p>
@@ -5912,70 +5912,6 @@
       </p:sp>
       <p:sp>
         <p:nvSpPr>
-          <p:cNvPr id="3074" name="Rectangle 2"/>
-          <p:cNvSpPr>
-            <a:spLocks noGrp="1" noChangeArrowheads="1"/>
-          </p:cNvSpPr>
-          <p:nvPr>
-            <p:ph type="subTitle" idx="4294967295"/>
-          </p:nvPr>
-        </p:nvSpPr>
-        <p:spPr>
-          <a:xfrm>
-            <a:off x="503238" y="3059113"/>
-            <a:ext cx="9070975" cy="649287"/>
-          </a:xfrm>
-        </p:spPr>
-        <p:txBody>
-          <a:bodyPr anchor="ctr"/>
-          <a:lstStyle/>
-          <a:p>
-            <a:pPr marL="0" indent="0" algn="ctr" eaLnBrk="1">
-              <a:spcBef>
-                <a:spcPct val="0"/>
-              </a:spcBef>
-              <a:tabLst>
-                <a:tab pos="449263" algn="l"/>
-                <a:tab pos="898525" algn="l"/>
-                <a:tab pos="1347788" algn="l"/>
-                <a:tab pos="1797050" algn="l"/>
-                <a:tab pos="2246313" algn="l"/>
-                <a:tab pos="2695575" algn="l"/>
-                <a:tab pos="3144838" algn="l"/>
-                <a:tab pos="3594100" algn="l"/>
-                <a:tab pos="4043363" algn="l"/>
-                <a:tab pos="4492625" algn="l"/>
-                <a:tab pos="4941888" algn="l"/>
-                <a:tab pos="5391150" algn="l"/>
-                <a:tab pos="5840413" algn="l"/>
-                <a:tab pos="6289675" algn="l"/>
-                <a:tab pos="6738938" algn="l"/>
-                <a:tab pos="7188200" algn="l"/>
-                <a:tab pos="7637463" algn="l"/>
-                <a:tab pos="8086725" algn="l"/>
-                <a:tab pos="8535988" algn="l"/>
-                <a:tab pos="8985250" algn="l"/>
-              </a:tabLst>
-              <a:defRPr/>
-            </a:pPr>
-            <a:r>
-              <a:rPr lang="en-GB" altLang="x-none" dirty="0">
-                <a:hlinkClick r:id="rId3"/>
-              </a:rPr>
-              <a:t>http://</a:t>
-            </a:r>
-            <a:r>
-              <a:rPr lang="en-GB" altLang="x-none" dirty="0" smtClean="0">
-                <a:hlinkClick r:id="rId3"/>
-              </a:rPr>
-              <a:t>www.mariannebezaire.com/ca1_graphic</a:t>
-            </a:r>
-            <a:endParaRPr lang="en-GB" altLang="x-none" dirty="0" smtClean="0"/>
-          </a:p>
-        </p:txBody>
-      </p:sp>
-      <p:sp>
-        <p:nvSpPr>
           <p:cNvPr id="3075" name="Text Box 3"/>
           <p:cNvSpPr txBox="1">
             <a:spLocks noChangeArrowheads="1"/>
@@ -6416,7 +6352,7 @@
         </p:nvSpPr>
         <p:spPr bwMode="auto">
           <a:xfrm>
-            <a:off x="1295400" y="4932363"/>
+            <a:off x="1079872" y="2557364"/>
             <a:ext cx="7488238" cy="1250950"/>
           </a:xfrm>
           <a:prstGeom prst="rect">
@@ -6784,12 +6720,142 @@
               <a:defRPr/>
             </a:pPr>
             <a:r>
+              <a:rPr lang="en-GB" altLang="x-none" dirty="0"/>
+              <a:t>An interactive anatomical database, graphical representation and full scale model of hippocampal area </a:t>
+            </a:r>
+            <a:r>
               <a:rPr lang="en-GB" altLang="x-none" dirty="0" smtClean="0"/>
-              <a:t>An interactive anatomical database, graphical representation and full scale model of hippocampal area CA1</a:t>
-            </a:r>
-            <a:endParaRPr lang="en-GB" altLang="x-none" dirty="0" smtClean="0">
-              <a:hlinkClick r:id="rId4" invalidUrl="https://github.com/NeuralEnsemble/NeuroinformaticsTutorial/tree/master/Part 1 - Resources for computational modellers"/>
-            </a:endParaRPr>
+              <a:t>CA1</a:t>
+            </a:r>
+          </a:p>
+          <a:p>
+            <a:pPr algn="just" eaLnBrk="1">
+              <a:lnSpc>
+                <a:spcPct val="93000"/>
+              </a:lnSpc>
+              <a:buClr>
+                <a:srgbClr val="000000"/>
+              </a:buClr>
+              <a:buSzPct val="100000"/>
+              <a:buFont typeface="Times New Roman" charset="0"/>
+              <a:buNone/>
+              <a:defRPr/>
+            </a:pPr>
+            <a:endParaRPr lang="en-GB" altLang="x-none" dirty="0"/>
+          </a:p>
+          <a:p>
+            <a:pPr algn="just" eaLnBrk="1">
+              <a:lnSpc>
+                <a:spcPct val="93000"/>
+              </a:lnSpc>
+              <a:buClr>
+                <a:srgbClr val="000000"/>
+              </a:buClr>
+              <a:buSzPct val="100000"/>
+              <a:buFont typeface="Times New Roman" charset="0"/>
+              <a:buNone/>
+              <a:defRPr/>
+            </a:pPr>
+            <a:r>
+              <a:rPr lang="en-GB" altLang="x-none" dirty="0" smtClean="0"/>
+              <a:t>Estimation of cell numbers:</a:t>
+            </a:r>
+          </a:p>
+          <a:p>
+            <a:pPr algn="just" eaLnBrk="1">
+              <a:lnSpc>
+                <a:spcPct val="93000"/>
+              </a:lnSpc>
+              <a:buClr>
+                <a:srgbClr val="000000"/>
+              </a:buClr>
+              <a:buSzPct val="100000"/>
+              <a:buFont typeface="Times New Roman" charset="0"/>
+              <a:buNone/>
+              <a:defRPr/>
+            </a:pPr>
+            <a:endParaRPr lang="en-GB" altLang="x-none" dirty="0"/>
+          </a:p>
+          <a:p>
+            <a:pPr algn="just" eaLnBrk="1">
+              <a:lnSpc>
+                <a:spcPct val="93000"/>
+              </a:lnSpc>
+              <a:buClr>
+                <a:srgbClr val="000000"/>
+              </a:buClr>
+              <a:buSzPct val="100000"/>
+              <a:buFont typeface="Times New Roman" charset="0"/>
+              <a:buNone/>
+              <a:defRPr/>
+            </a:pPr>
+            <a:endParaRPr lang="en-GB" altLang="x-none" dirty="0" smtClean="0"/>
+          </a:p>
+          <a:p>
+            <a:pPr algn="just" eaLnBrk="1">
+              <a:lnSpc>
+                <a:spcPct val="93000"/>
+              </a:lnSpc>
+              <a:buClr>
+                <a:srgbClr val="000000"/>
+              </a:buClr>
+              <a:buSzPct val="100000"/>
+              <a:buFont typeface="Times New Roman" charset="0"/>
+              <a:buNone/>
+              <a:defRPr/>
+            </a:pPr>
+            <a:r>
+              <a:rPr lang="en-GB" altLang="x-none" dirty="0" smtClean="0"/>
+              <a:t>Graphical description of model:</a:t>
+            </a:r>
+          </a:p>
+          <a:p>
+            <a:pPr algn="just" eaLnBrk="1">
+              <a:lnSpc>
+                <a:spcPct val="93000"/>
+              </a:lnSpc>
+              <a:buClr>
+                <a:srgbClr val="000000"/>
+              </a:buClr>
+              <a:buSzPct val="100000"/>
+              <a:buFont typeface="Times New Roman" charset="0"/>
+              <a:buNone/>
+              <a:defRPr/>
+            </a:pPr>
+            <a:endParaRPr lang="en-GB" altLang="x-none" dirty="0"/>
+          </a:p>
+          <a:p>
+            <a:pPr algn="just" eaLnBrk="1">
+              <a:lnSpc>
+                <a:spcPct val="93000"/>
+              </a:lnSpc>
+              <a:buClr>
+                <a:srgbClr val="000000"/>
+              </a:buClr>
+              <a:buSzPct val="100000"/>
+              <a:buFont typeface="Times New Roman" charset="0"/>
+              <a:buNone/>
+              <a:defRPr/>
+            </a:pPr>
+            <a:endParaRPr lang="en-GB" altLang="x-none" dirty="0" smtClean="0"/>
+          </a:p>
+          <a:p>
+            <a:pPr algn="just" eaLnBrk="1">
+              <a:lnSpc>
+                <a:spcPct val="93000"/>
+              </a:lnSpc>
+              <a:buClr>
+                <a:srgbClr val="000000"/>
+              </a:buClr>
+              <a:buSzPct val="100000"/>
+              <a:buFont typeface="Times New Roman" charset="0"/>
+              <a:buNone/>
+              <a:defRPr/>
+            </a:pPr>
+            <a:r>
+              <a:rPr lang="en-GB" altLang="x-none" dirty="0" smtClean="0"/>
+              <a:t>Model code:</a:t>
+            </a:r>
           </a:p>
         </p:txBody>
       </p:sp>
@@ -7269,6 +7335,192 @@
                 <a:schemeClr val="bg2"/>
               </a:solidFill>
             </a:endParaRPr>
+          </a:p>
+        </p:txBody>
+      </p:sp>
+      <p:sp>
+        <p:nvSpPr>
+          <p:cNvPr id="8" name="Rectangle 7"/>
+          <p:cNvSpPr/>
+          <p:nvPr/>
+        </p:nvSpPr>
+        <p:spPr>
+          <a:xfrm>
+            <a:off x="1071085" y="3530489"/>
+            <a:ext cx="7211912" cy="461665"/>
+          </a:xfrm>
+          <a:prstGeom prst="rect">
+            <a:avLst/>
+          </a:prstGeom>
+        </p:spPr>
+        <p:txBody>
+          <a:bodyPr wrap="square">
+            <a:spAutoFit/>
+          </a:bodyPr>
+          <a:lstStyle/>
+          <a:p>
+            <a:r>
+              <a:rPr lang="en-US" sz="2400" u="sng" dirty="0">
+                <a:solidFill>
+                  <a:schemeClr val="accent2"/>
+                </a:solidFill>
+              </a:rPr>
+              <a:t>http://</a:t>
+            </a:r>
+            <a:r>
+              <a:rPr lang="en-US" sz="2400" u="sng" dirty="0" err="1">
+                <a:solidFill>
+                  <a:schemeClr val="accent2"/>
+                </a:solidFill>
+              </a:rPr>
+              <a:t>mariannebezaire.com</a:t>
+            </a:r>
+            <a:r>
+              <a:rPr lang="en-US" sz="2400" u="sng" dirty="0">
+                <a:solidFill>
+                  <a:schemeClr val="accent2"/>
+                </a:solidFill>
+              </a:rPr>
+              <a:t>/</a:t>
+            </a:r>
+            <a:r>
+              <a:rPr lang="en-US" sz="2400" u="sng" dirty="0" err="1">
+                <a:solidFill>
+                  <a:schemeClr val="accent2"/>
+                </a:solidFill>
+              </a:rPr>
+              <a:t>qagraphic</a:t>
+            </a:r>
+            <a:r>
+              <a:rPr lang="en-US" sz="2400" u="sng" dirty="0">
+                <a:solidFill>
+                  <a:schemeClr val="accent2"/>
+                </a:solidFill>
+              </a:rPr>
+              <a:t>/</a:t>
+            </a:r>
+            <a:r>
+              <a:rPr lang="en-US" sz="2400" u="sng" dirty="0" err="1">
+                <a:solidFill>
+                  <a:schemeClr val="accent2"/>
+                </a:solidFill>
+              </a:rPr>
+              <a:t>myQA.html</a:t>
+            </a:r>
+            <a:endParaRPr lang="en-US" sz="2400" u="sng" dirty="0">
+              <a:solidFill>
+                <a:schemeClr val="accent2"/>
+              </a:solidFill>
+            </a:endParaRPr>
+          </a:p>
+        </p:txBody>
+      </p:sp>
+      <p:sp>
+        <p:nvSpPr>
+          <p:cNvPr id="12" name="Rectangle 11"/>
+          <p:cNvSpPr/>
+          <p:nvPr/>
+        </p:nvSpPr>
+        <p:spPr>
+          <a:xfrm>
+            <a:off x="1079872" y="4324128"/>
+            <a:ext cx="8080273" cy="461665"/>
+          </a:xfrm>
+          <a:prstGeom prst="rect">
+            <a:avLst/>
+          </a:prstGeom>
+        </p:spPr>
+        <p:txBody>
+          <a:bodyPr wrap="square">
+            <a:spAutoFit/>
+          </a:bodyPr>
+          <a:lstStyle/>
+          <a:p>
+            <a:r>
+              <a:rPr lang="en-US" sz="2400" u="sng" dirty="0">
+                <a:solidFill>
+                  <a:schemeClr val="accent2"/>
+                </a:solidFill>
+              </a:rPr>
+              <a:t>http://</a:t>
+            </a:r>
+            <a:r>
+              <a:rPr lang="en-US" sz="2400" u="sng" dirty="0" err="1">
+                <a:solidFill>
+                  <a:schemeClr val="accent2"/>
+                </a:solidFill>
+              </a:rPr>
+              <a:t>mariannebezaire.com</a:t>
+            </a:r>
+            <a:r>
+              <a:rPr lang="en-US" sz="2400" u="sng" dirty="0">
+                <a:solidFill>
+                  <a:schemeClr val="accent2"/>
+                </a:solidFill>
+              </a:rPr>
+              <a:t>/ca1_graphic/</a:t>
+            </a:r>
+            <a:r>
+              <a:rPr lang="en-US" sz="2400" u="sng" dirty="0" err="1">
+                <a:solidFill>
+                  <a:schemeClr val="accent2"/>
+                </a:solidFill>
+              </a:rPr>
+              <a:t>mymodel.html</a:t>
+            </a:r>
+            <a:endParaRPr lang="en-US" sz="2400" u="sng" dirty="0">
+              <a:solidFill>
+                <a:schemeClr val="accent2"/>
+              </a:solidFill>
+            </a:endParaRPr>
+          </a:p>
+        </p:txBody>
+      </p:sp>
+      <p:sp>
+        <p:nvSpPr>
+          <p:cNvPr id="13" name="Rectangle 12"/>
+          <p:cNvSpPr/>
+          <p:nvPr/>
+        </p:nvSpPr>
+        <p:spPr>
+          <a:xfrm>
+            <a:off x="1079871" y="5070774"/>
+            <a:ext cx="8080273" cy="461665"/>
+          </a:xfrm>
+          <a:prstGeom prst="rect">
+            <a:avLst/>
+          </a:prstGeom>
+        </p:spPr>
+        <p:txBody>
+          <a:bodyPr wrap="square">
+            <a:spAutoFit/>
+          </a:bodyPr>
+          <a:lstStyle/>
+          <a:p>
+            <a:r>
+              <a:rPr lang="en-US" sz="2400" u="sng" dirty="0">
+                <a:solidFill>
+                  <a:schemeClr val="accent2"/>
+                </a:solidFill>
+              </a:rPr>
+              <a:t>http://</a:t>
+            </a:r>
+            <a:r>
+              <a:rPr lang="en-US" sz="2400" u="sng" dirty="0" err="1">
+                <a:solidFill>
+                  <a:schemeClr val="accent2"/>
+                </a:solidFill>
+              </a:rPr>
+              <a:t>mariannebezaire.com</a:t>
+            </a:r>
+            <a:r>
+              <a:rPr lang="en-US" sz="2400" u="sng" dirty="0">
+                <a:solidFill>
+                  <a:schemeClr val="accent2"/>
+                </a:solidFill>
+              </a:rPr>
+              <a:t>/models/ca1/</a:t>
+            </a:r>
           </a:p>
         </p:txBody>
       </p:sp>
@@ -7631,7 +7883,7 @@
               <a:defRPr/>
             </a:pPr>
             <a:r>
-              <a:rPr lang="en-GB" altLang="x-none" i="1" smtClean="0">
+              <a:rPr lang="en-GB" altLang="x-none" sz="2400" i="1" smtClean="0">
                 <a:solidFill>
                   <a:srgbClr val="666666"/>
                 </a:solidFill>
@@ -7663,7 +7915,7 @@
         </p:blipFill>
         <p:spPr>
           <a:xfrm>
-            <a:off x="0" y="368300"/>
+            <a:off x="0" y="518438"/>
             <a:ext cx="10058400" cy="6789791"/>
           </a:xfrm>
           <a:prstGeom prst="rect">
@@ -7671,6 +7923,403 @@
           </a:prstGeom>
         </p:spPr>
       </p:pic>
+      <p:sp>
+        <p:nvSpPr>
+          <p:cNvPr id="4" name="Rectangle 3"/>
+          <p:cNvSpPr/>
+          <p:nvPr/>
+        </p:nvSpPr>
+        <p:spPr>
+          <a:xfrm>
+            <a:off x="132656" y="77812"/>
+            <a:ext cx="7211912" cy="461665"/>
+          </a:xfrm>
+          <a:prstGeom prst="rect">
+            <a:avLst/>
+          </a:prstGeom>
+        </p:spPr>
+        <p:txBody>
+          <a:bodyPr wrap="square">
+            <a:spAutoFit/>
+          </a:bodyPr>
+          <a:lstStyle/>
+          <a:p>
+            <a:r>
+              <a:rPr lang="en-US" sz="2400" u="sng" dirty="0">
+                <a:solidFill>
+                  <a:schemeClr val="accent2"/>
+                </a:solidFill>
+              </a:rPr>
+              <a:t>http://</a:t>
+            </a:r>
+            <a:r>
+              <a:rPr lang="en-US" sz="2400" u="sng" dirty="0" err="1">
+                <a:solidFill>
+                  <a:schemeClr val="accent2"/>
+                </a:solidFill>
+              </a:rPr>
+              <a:t>mariannebezaire.com</a:t>
+            </a:r>
+            <a:r>
+              <a:rPr lang="en-US" sz="2400" u="sng" dirty="0">
+                <a:solidFill>
+                  <a:schemeClr val="accent2"/>
+                </a:solidFill>
+              </a:rPr>
+              <a:t>/</a:t>
+            </a:r>
+            <a:r>
+              <a:rPr lang="en-US" sz="2400" u="sng" dirty="0" err="1">
+                <a:solidFill>
+                  <a:schemeClr val="accent2"/>
+                </a:solidFill>
+              </a:rPr>
+              <a:t>qagraphic</a:t>
+            </a:r>
+            <a:r>
+              <a:rPr lang="en-US" sz="2400" u="sng" dirty="0">
+                <a:solidFill>
+                  <a:schemeClr val="accent2"/>
+                </a:solidFill>
+              </a:rPr>
+              <a:t>/</a:t>
+            </a:r>
+            <a:r>
+              <a:rPr lang="en-US" sz="2400" u="sng" dirty="0" err="1">
+                <a:solidFill>
+                  <a:schemeClr val="accent2"/>
+                </a:solidFill>
+              </a:rPr>
+              <a:t>myQA.html</a:t>
+            </a:r>
+            <a:endParaRPr lang="en-US" sz="2400" u="sng" dirty="0">
+              <a:solidFill>
+                <a:schemeClr val="accent2"/>
+              </a:solidFill>
+            </a:endParaRPr>
+          </a:p>
+        </p:txBody>
+      </p:sp>
+      <p:sp>
+        <p:nvSpPr>
+          <p:cNvPr id="6" name="Rectangle 5"/>
+          <p:cNvSpPr/>
+          <p:nvPr/>
+        </p:nvSpPr>
+        <p:spPr bwMode="auto">
+          <a:xfrm>
+            <a:off x="0" y="4500191"/>
+            <a:ext cx="6480472" cy="791814"/>
+          </a:xfrm>
+          <a:prstGeom prst="rect">
+            <a:avLst/>
+          </a:prstGeom>
+          <a:solidFill>
+            <a:schemeClr val="bg1"/>
+          </a:solidFill>
+          <a:ln w="9525" cap="flat" cmpd="sng" algn="ctr">
+            <a:noFill/>
+            <a:prstDash val="solid"/>
+            <a:round/>
+            <a:headEnd type="none" w="med" len="med"/>
+            <a:tailEnd type="none" w="med" len="med"/>
+          </a:ln>
+          <a:effectLst/>
+          <a:extLst/>
+        </p:spPr>
+        <p:txBody>
+          <a:bodyPr vert="horz" wrap="square" lIns="91440" tIns="45720" rIns="91440" bIns="45720" numCol="1" rtlCol="0" anchor="t" anchorCtr="0" compatLnSpc="1">
+            <a:prstTxWarp prst="textNoShape">
+              <a:avLst/>
+            </a:prstTxWarp>
+          </a:bodyPr>
+          <a:lstStyle/>
+          <a:p>
+            <a:pPr marL="0" marR="0" indent="0" algn="l" defTabSz="449263" rtl="0" eaLnBrk="1" fontAlgn="base" latinLnBrk="0" hangingPunct="0">
+              <a:lnSpc>
+                <a:spcPct val="93000"/>
+              </a:lnSpc>
+              <a:spcBef>
+                <a:spcPct val="0"/>
+              </a:spcBef>
+              <a:spcAft>
+                <a:spcPct val="0"/>
+              </a:spcAft>
+              <a:buClr>
+                <a:srgbClr val="000000"/>
+              </a:buClr>
+              <a:buSzPct val="100000"/>
+              <a:buFont typeface="Times New Roman" charset="0"/>
+              <a:buNone/>
+              <a:tabLst/>
+            </a:pPr>
+            <a:endParaRPr kumimoji="0" lang="en-US" sz="1800" b="0" i="0" u="none" strike="noStrike" cap="none" normalizeH="0" baseline="0">
+              <a:ln>
+                <a:noFill/>
+              </a:ln>
+              <a:effectLst/>
+              <a:latin typeface="Arial" charset="0"/>
+            </a:endParaRPr>
+          </a:p>
+        </p:txBody>
+      </p:sp>
+      <p:pic>
+        <p:nvPicPr>
+          <p:cNvPr id="5" name="Picture 4"/>
+          <p:cNvPicPr>
+            <a:picLocks noChangeAspect="1"/>
+          </p:cNvPicPr>
+          <p:nvPr/>
+        </p:nvPicPr>
+        <p:blipFill rotWithShape="1">
+          <a:blip r:embed="rId4"/>
+          <a:srcRect l="1375" r="-1375"/>
+          <a:stretch/>
+        </p:blipFill>
+        <p:spPr>
+          <a:xfrm>
+            <a:off x="4212344" y="4896098"/>
+            <a:ext cx="2087984" cy="1158240"/>
+          </a:xfrm>
+          <a:prstGeom prst="rect">
+            <a:avLst/>
+          </a:prstGeom>
+        </p:spPr>
+      </p:pic>
+      <p:sp>
+        <p:nvSpPr>
+          <p:cNvPr id="3" name="TextBox 2"/>
+          <p:cNvSpPr txBox="1"/>
+          <p:nvPr/>
+        </p:nvSpPr>
+        <p:spPr>
+          <a:xfrm>
+            <a:off x="-39728" y="4500191"/>
+            <a:ext cx="4071928" cy="2862322"/>
+          </a:xfrm>
+          <a:prstGeom prst="rect">
+            <a:avLst/>
+          </a:prstGeom>
+          <a:noFill/>
+        </p:spPr>
+        <p:txBody>
+          <a:bodyPr wrap="square" rtlCol="0">
+            <a:spAutoFit/>
+          </a:bodyPr>
+          <a:lstStyle/>
+          <a:p>
+            <a:pPr marL="285750" indent="-285750">
+              <a:buFont typeface="Arial" charset="0"/>
+              <a:buChar char="•"/>
+            </a:pPr>
+            <a:r>
+              <a:rPr lang="en-US" dirty="0" smtClean="0"/>
+              <a:t>Each box represents a calculation towards cell number estimates, from </a:t>
+            </a:r>
+            <a:r>
+              <a:rPr lang="en-US" dirty="0" err="1" smtClean="0"/>
+              <a:t>Bezaire</a:t>
+            </a:r>
+            <a:r>
+              <a:rPr lang="en-US" dirty="0" smtClean="0"/>
+              <a:t> &amp; </a:t>
+            </a:r>
+            <a:r>
+              <a:rPr lang="en-US" dirty="0" err="1" smtClean="0"/>
+              <a:t>Soltesz</a:t>
+            </a:r>
+            <a:r>
+              <a:rPr lang="en-US" dirty="0" smtClean="0"/>
+              <a:t>, 2013. </a:t>
+            </a:r>
+          </a:p>
+          <a:p>
+            <a:pPr marL="285750" indent="-285750">
+              <a:buFont typeface="Arial" charset="0"/>
+              <a:buChar char="•"/>
+            </a:pPr>
+            <a:endParaRPr lang="en-US" dirty="0"/>
+          </a:p>
+          <a:p>
+            <a:pPr marL="285750" indent="-285750">
+              <a:buFont typeface="Arial" charset="0"/>
+              <a:buChar char="•"/>
+            </a:pPr>
+            <a:r>
+              <a:rPr lang="en-US" dirty="0" smtClean="0"/>
+              <a:t>The green &amp; yellow references can be clicked to show details:</a:t>
+            </a:r>
+          </a:p>
+          <a:p>
+            <a:pPr marL="285750" indent="-285750">
+              <a:buFont typeface="Arial" charset="0"/>
+              <a:buChar char="•"/>
+            </a:pPr>
+            <a:endParaRPr lang="en-US" dirty="0"/>
+          </a:p>
+          <a:p>
+            <a:pPr marL="285750" indent="-285750">
+              <a:buFont typeface="Arial" charset="0"/>
+              <a:buChar char="•"/>
+            </a:pPr>
+            <a:r>
+              <a:rPr lang="en-US" dirty="0" smtClean="0"/>
+              <a:t>Under development is the ability to edit assumptions or data and then recalculate estimates</a:t>
+            </a:r>
+            <a:endParaRPr lang="en-US" dirty="0"/>
+          </a:p>
+        </p:txBody>
+      </p:sp>
+      <p:pic>
+        <p:nvPicPr>
+          <p:cNvPr id="7" name="Picture 6"/>
+          <p:cNvPicPr>
+            <a:picLocks noChangeAspect="1"/>
+          </p:cNvPicPr>
+          <p:nvPr/>
+        </p:nvPicPr>
+        <p:blipFill>
+          <a:blip r:embed="rId5"/>
+          <a:stretch>
+            <a:fillRect/>
+          </a:stretch>
+        </p:blipFill>
+        <p:spPr>
+          <a:xfrm>
+            <a:off x="4212344" y="6100773"/>
+            <a:ext cx="2087984" cy="1135991"/>
+          </a:xfrm>
+          <a:prstGeom prst="rect">
+            <a:avLst/>
+          </a:prstGeom>
+        </p:spPr>
+      </p:pic>
+      <p:cxnSp>
+        <p:nvCxnSpPr>
+          <p:cNvPr id="9" name="Straight Arrow Connector 8"/>
+          <p:cNvCxnSpPr/>
+          <p:nvPr/>
+        </p:nvCxnSpPr>
+        <p:spPr bwMode="auto">
+          <a:xfrm flipV="1">
+            <a:off x="3672160" y="4283893"/>
+            <a:ext cx="540184" cy="720080"/>
+          </a:xfrm>
+          <a:prstGeom prst="straightConnector1">
+            <a:avLst/>
+          </a:prstGeom>
+          <a:solidFill>
+            <a:srgbClr val="00B8FF"/>
+          </a:solidFill>
+          <a:ln w="63500" cap="flat" cmpd="sng" algn="ctr">
+            <a:solidFill>
+              <a:schemeClr val="tx1"/>
+            </a:solidFill>
+            <a:prstDash val="solid"/>
+            <a:round/>
+            <a:headEnd type="none" w="med" len="med"/>
+            <a:tailEnd type="triangle" w="lg" len="med"/>
+          </a:ln>
+          <a:effectLst/>
+          <a:extLst>
+            <a:ext uri="{AF507438-7753-43E0-B8FC-AC1667EBCBE1}">
+              <a14:hiddenEffects xmlns:a14="http://schemas.microsoft.com/office/drawing/2010/main">
+                <a:effectLst>
+                  <a:outerShdw blurRad="63500" dist="38099" dir="2700000" algn="ctr" rotWithShape="0">
+                    <a:schemeClr val="bg2">
+                      <a:alpha val="74998"/>
+                    </a:schemeClr>
+                  </a:outerShdw>
+                </a:effectLst>
+              </a14:hiddenEffects>
+            </a:ext>
+          </a:extLst>
+        </p:spPr>
+      </p:cxnSp>
+      <p:cxnSp>
+        <p:nvCxnSpPr>
+          <p:cNvPr id="11" name="Straight Arrow Connector 10"/>
+          <p:cNvCxnSpPr/>
+          <p:nvPr/>
+        </p:nvCxnSpPr>
+        <p:spPr bwMode="auto">
+          <a:xfrm flipV="1">
+            <a:off x="3606041" y="5940077"/>
+            <a:ext cx="606303" cy="160696"/>
+          </a:xfrm>
+          <a:prstGeom prst="straightConnector1">
+            <a:avLst/>
+          </a:prstGeom>
+          <a:solidFill>
+            <a:srgbClr val="00B8FF"/>
+          </a:solidFill>
+          <a:ln w="63500" cap="flat" cmpd="sng" algn="ctr">
+            <a:solidFill>
+              <a:schemeClr val="tx1"/>
+            </a:solidFill>
+            <a:prstDash val="solid"/>
+            <a:round/>
+            <a:headEnd type="none" w="med" len="med"/>
+            <a:tailEnd type="triangle" w="lg" len="med"/>
+          </a:ln>
+          <a:effectLst/>
+          <a:extLst>
+            <a:ext uri="{AF507438-7753-43E0-B8FC-AC1667EBCBE1}">
+              <a14:hiddenEffects xmlns:a14="http://schemas.microsoft.com/office/drawing/2010/main">
+                <a:effectLst>
+                  <a:outerShdw blurRad="63500" dist="38099" dir="2700000" algn="ctr" rotWithShape="0">
+                    <a:schemeClr val="bg2">
+                      <a:alpha val="74998"/>
+                    </a:schemeClr>
+                  </a:outerShdw>
+                </a:effectLst>
+              </a14:hiddenEffects>
+            </a:ext>
+          </a:extLst>
+        </p:spPr>
+      </p:cxnSp>
+      <p:cxnSp>
+        <p:nvCxnSpPr>
+          <p:cNvPr id="13" name="Straight Arrow Connector 12"/>
+          <p:cNvCxnSpPr/>
+          <p:nvPr/>
+        </p:nvCxnSpPr>
+        <p:spPr bwMode="auto">
+          <a:xfrm>
+            <a:off x="3623708" y="6200441"/>
+            <a:ext cx="588636" cy="340958"/>
+          </a:xfrm>
+          <a:prstGeom prst="straightConnector1">
+            <a:avLst/>
+          </a:prstGeom>
+          <a:solidFill>
+            <a:srgbClr val="00B8FF"/>
+          </a:solidFill>
+          <a:ln w="63500" cap="flat" cmpd="sng" algn="ctr">
+            <a:solidFill>
+              <a:schemeClr val="tx1"/>
+            </a:solidFill>
+            <a:prstDash val="solid"/>
+            <a:round/>
+            <a:headEnd type="none" w="med" len="med"/>
+            <a:tailEnd type="triangle" w="lg" len="med"/>
+          </a:ln>
+          <a:effectLst/>
+          <a:extLst>
+            <a:ext uri="{AF507438-7753-43E0-B8FC-AC1667EBCBE1}">
+              <a14:hiddenEffects xmlns:a14="http://schemas.microsoft.com/office/drawing/2010/main">
+                <a:effectLst>
+                  <a:outerShdw blurRad="63500" dist="38099" dir="2700000" algn="ctr" rotWithShape="0">
+                    <a:schemeClr val="bg2">
+                      <a:alpha val="74998"/>
+                    </a:schemeClr>
+                  </a:outerShdw>
+                </a:effectLst>
+              </a14:hiddenEffects>
+            </a:ext>
+          </a:extLst>
+        </p:spPr>
+      </p:cxnSp>
     </p:spTree>
   </p:cSld>
   <p:clrMapOvr>
@@ -8048,7 +8697,7 @@
           </p:cNvPicPr>
           <p:nvPr/>
         </p:nvPicPr>
-        <p:blipFill>
+        <p:blipFill rotWithShape="1">
           <a:blip r:embed="rId3">
             <a:extLst>
               <a:ext uri="{28A0092B-C50C-407E-A947-70E740481C1C}">
@@ -8056,20 +8705,274 @@
               </a:ext>
             </a:extLst>
           </a:blip>
+          <a:srcRect b="3668"/>
+          <a:stretch/>
+        </p:blipFill>
+        <p:spPr>
+          <a:xfrm>
+            <a:off x="0" y="342900"/>
+            <a:ext cx="10058400" cy="6583680"/>
+          </a:xfrm>
+          <a:prstGeom prst="rect">
+            <a:avLst/>
+          </a:prstGeom>
+        </p:spPr>
+      </p:pic>
+      <p:sp>
+        <p:nvSpPr>
+          <p:cNvPr id="5" name="Rectangle 4"/>
+          <p:cNvSpPr/>
+          <p:nvPr/>
+        </p:nvSpPr>
+        <p:spPr>
+          <a:xfrm>
+            <a:off x="2376016" y="112067"/>
+            <a:ext cx="8080273" cy="461665"/>
+          </a:xfrm>
+          <a:prstGeom prst="rect">
+            <a:avLst/>
+          </a:prstGeom>
+        </p:spPr>
+        <p:txBody>
+          <a:bodyPr wrap="square">
+            <a:spAutoFit/>
+          </a:bodyPr>
+          <a:lstStyle/>
+          <a:p>
+            <a:r>
+              <a:rPr lang="en-US" sz="2400" u="sng" dirty="0">
+                <a:solidFill>
+                  <a:schemeClr val="accent2"/>
+                </a:solidFill>
+              </a:rPr>
+              <a:t>http://</a:t>
+            </a:r>
+            <a:r>
+              <a:rPr lang="en-US" sz="2400" u="sng" dirty="0" err="1">
+                <a:solidFill>
+                  <a:schemeClr val="accent2"/>
+                </a:solidFill>
+              </a:rPr>
+              <a:t>mariannebezaire.com</a:t>
+            </a:r>
+            <a:r>
+              <a:rPr lang="en-US" sz="2400" u="sng" dirty="0">
+                <a:solidFill>
+                  <a:schemeClr val="accent2"/>
+                </a:solidFill>
+              </a:rPr>
+              <a:t>/ca1_graphic/</a:t>
+            </a:r>
+            <a:r>
+              <a:rPr lang="en-US" sz="2400" u="sng" dirty="0" err="1">
+                <a:solidFill>
+                  <a:schemeClr val="accent2"/>
+                </a:solidFill>
+              </a:rPr>
+              <a:t>mymodel.html</a:t>
+            </a:r>
+            <a:endParaRPr lang="en-US" sz="2400" u="sng" dirty="0">
+              <a:solidFill>
+                <a:schemeClr val="accent2"/>
+              </a:solidFill>
+            </a:endParaRPr>
+          </a:p>
+        </p:txBody>
+      </p:sp>
+      <p:sp>
+        <p:nvSpPr>
+          <p:cNvPr id="6" name="TextBox 5"/>
+          <p:cNvSpPr txBox="1"/>
+          <p:nvPr/>
+        </p:nvSpPr>
+        <p:spPr>
+          <a:xfrm>
+            <a:off x="24575" y="6890977"/>
+            <a:ext cx="4071928" cy="646331"/>
+          </a:xfrm>
+          <a:prstGeom prst="rect">
+            <a:avLst/>
+          </a:prstGeom>
+          <a:noFill/>
+        </p:spPr>
+        <p:txBody>
+          <a:bodyPr wrap="square" rtlCol="0">
+            <a:spAutoFit/>
+          </a:bodyPr>
+          <a:lstStyle/>
+          <a:p>
+            <a:pPr marL="285750" indent="-285750">
+              <a:buFont typeface="Arial" charset="0"/>
+              <a:buChar char="•"/>
+            </a:pPr>
+            <a:r>
+              <a:rPr lang="en-US" dirty="0" smtClean="0"/>
+              <a:t>Click each cell or channel </a:t>
+            </a:r>
+            <a:r>
+              <a:rPr lang="en-US" smtClean="0"/>
+              <a:t>for additional information:</a:t>
+            </a:r>
+            <a:endParaRPr lang="en-US" dirty="0"/>
+          </a:p>
+        </p:txBody>
+      </p:sp>
+      <p:pic>
+        <p:nvPicPr>
+          <p:cNvPr id="4" name="Picture 3"/>
+          <p:cNvPicPr>
+            <a:picLocks noChangeAspect="1"/>
+          </p:cNvPicPr>
+          <p:nvPr/>
+        </p:nvPicPr>
+        <p:blipFill>
+          <a:blip r:embed="rId4"/>
           <a:stretch>
             <a:fillRect/>
           </a:stretch>
         </p:blipFill>
         <p:spPr>
           <a:xfrm>
-            <a:off x="0" y="342900"/>
-            <a:ext cx="10058400" cy="6834363"/>
+            <a:off x="3630778" y="4715941"/>
+            <a:ext cx="3446673" cy="2699611"/>
           </a:xfrm>
           <a:prstGeom prst="rect">
             <a:avLst/>
           </a:prstGeom>
+          <a:ln w="22225">
+            <a:solidFill>
+              <a:schemeClr val="tx1"/>
+            </a:solidFill>
+          </a:ln>
+          <a:effectLst>
+            <a:outerShdw blurRad="63500" sx="102000" sy="102000" algn="ctr" rotWithShape="0">
+              <a:prstClr val="black">
+                <a:alpha val="40000"/>
+              </a:prstClr>
+            </a:outerShdw>
+          </a:effectLst>
         </p:spPr>
       </p:pic>
+      <p:pic>
+        <p:nvPicPr>
+          <p:cNvPr id="7" name="Picture 6"/>
+          <p:cNvPicPr>
+            <a:picLocks noChangeAspect="1"/>
+          </p:cNvPicPr>
+          <p:nvPr/>
+        </p:nvPicPr>
+        <p:blipFill>
+          <a:blip r:embed="rId5"/>
+          <a:stretch>
+            <a:fillRect/>
+          </a:stretch>
+        </p:blipFill>
+        <p:spPr>
+          <a:xfrm>
+            <a:off x="2117696" y="3634740"/>
+            <a:ext cx="3436603" cy="2995723"/>
+          </a:xfrm>
+          <a:prstGeom prst="rect">
+            <a:avLst/>
+          </a:prstGeom>
+          <a:ln w="22225">
+            <a:solidFill>
+              <a:schemeClr val="tx1"/>
+            </a:solidFill>
+          </a:ln>
+          <a:effectLst>
+            <a:outerShdw blurRad="63500" sx="102000" sy="102000" algn="ctr" rotWithShape="0">
+              <a:prstClr val="black">
+                <a:alpha val="40000"/>
+              </a:prstClr>
+            </a:outerShdw>
+          </a:effectLst>
+        </p:spPr>
+      </p:pic>
+      <p:cxnSp>
+        <p:nvCxnSpPr>
+          <p:cNvPr id="9" name="Straight Arrow Connector 8"/>
+          <p:cNvCxnSpPr/>
+          <p:nvPr/>
+        </p:nvCxnSpPr>
+        <p:spPr bwMode="auto">
+          <a:xfrm flipV="1">
+            <a:off x="3232889" y="6218273"/>
+            <a:ext cx="540184" cy="720080"/>
+          </a:xfrm>
+          <a:prstGeom prst="straightConnector1">
+            <a:avLst/>
+          </a:prstGeom>
+          <a:solidFill>
+            <a:srgbClr val="00B8FF"/>
+          </a:solidFill>
+          <a:ln w="63500" cap="flat" cmpd="sng" algn="ctr">
+            <a:solidFill>
+              <a:schemeClr val="tx1"/>
+            </a:solidFill>
+            <a:prstDash val="solid"/>
+            <a:round/>
+            <a:headEnd type="none" w="med" len="med"/>
+            <a:tailEnd type="triangle" w="lg" len="med"/>
+          </a:ln>
+          <a:effectLst/>
+          <a:extLst>
+            <a:ext uri="{AF507438-7753-43E0-B8FC-AC1667EBCBE1}">
+              <a14:hiddenEffects xmlns:a14="http://schemas.microsoft.com/office/drawing/2010/main">
+                <a:effectLst>
+                  <a:outerShdw blurRad="63500" dist="38099" dir="2700000" algn="ctr" rotWithShape="0">
+                    <a:schemeClr val="bg2">
+                      <a:alpha val="74998"/>
+                    </a:schemeClr>
+                  </a:outerShdw>
+                </a:effectLst>
+              </a14:hiddenEffects>
+            </a:ext>
+          </a:extLst>
+        </p:spPr>
+      </p:cxnSp>
+      <p:cxnSp>
+        <p:nvCxnSpPr>
+          <p:cNvPr id="10" name="Straight Arrow Connector 9"/>
+          <p:cNvCxnSpPr/>
+          <p:nvPr/>
+        </p:nvCxnSpPr>
+        <p:spPr bwMode="auto">
+          <a:xfrm>
+            <a:off x="3135120" y="7246570"/>
+            <a:ext cx="688623" cy="61695"/>
+          </a:xfrm>
+          <a:prstGeom prst="straightConnector1">
+            <a:avLst/>
+          </a:prstGeom>
+          <a:solidFill>
+            <a:srgbClr val="00B8FF"/>
+          </a:solidFill>
+          <a:ln w="63500" cap="flat" cmpd="sng" algn="ctr">
+            <a:solidFill>
+              <a:schemeClr val="tx1"/>
+            </a:solidFill>
+            <a:prstDash val="solid"/>
+            <a:round/>
+            <a:headEnd type="none" w="med" len="med"/>
+            <a:tailEnd type="triangle" w="lg" len="med"/>
+          </a:ln>
+          <a:effectLst/>
+          <a:extLst>
+            <a:ext uri="{AF507438-7753-43E0-B8FC-AC1667EBCBE1}">
+              <a14:hiddenEffects xmlns:a14="http://schemas.microsoft.com/office/drawing/2010/main">
+                <a:effectLst>
+                  <a:outerShdw blurRad="63500" dist="38099" dir="2700000" algn="ctr" rotWithShape="0">
+                    <a:schemeClr val="bg2">
+                      <a:alpha val="74998"/>
+                    </a:schemeClr>
+                  </a:outerShdw>
+                </a:effectLst>
+              </a14:hiddenEffects>
+            </a:ext>
+          </a:extLst>
+        </p:spPr>
+      </p:cxnSp>
     </p:spTree>
   </p:cSld>
   <p:clrMapOvr>

</xml_diff>